<commit_message>
Updated the slides with download instructions
</commit_message>
<xml_diff>
--- a/Courseware/Slides.pptx
+++ b/Courseware/Slides.pptx
@@ -11,12 +11,13 @@
     <p:sldId id="263" r:id="rId5"/>
     <p:sldId id="264" r:id="rId6"/>
     <p:sldId id="260" r:id="rId7"/>
-    <p:sldId id="261" r:id="rId8"/>
-    <p:sldId id="266" r:id="rId9"/>
-    <p:sldId id="267" r:id="rId10"/>
-    <p:sldId id="268" r:id="rId11"/>
-    <p:sldId id="270" r:id="rId12"/>
-    <p:sldId id="269" r:id="rId13"/>
+    <p:sldId id="271" r:id="rId8"/>
+    <p:sldId id="261" r:id="rId9"/>
+    <p:sldId id="266" r:id="rId10"/>
+    <p:sldId id="267" r:id="rId11"/>
+    <p:sldId id="268" r:id="rId12"/>
+    <p:sldId id="270" r:id="rId13"/>
+    <p:sldId id="269" r:id="rId14"/>
   </p:sldIdLst>
   <p:sldSz cx="9144000" cy="6858000" type="screen4x3"/>
   <p:notesSz cx="6858000" cy="9144000"/>
@@ -299,7 +300,7 @@
           <a:p>
             <a:fld id="{8B4F63E6-11C5-EA4B-89F5-9A8FD5F78CD0}" type="datetimeFigureOut">
               <a:rPr lang="en-US" smtClean="0"/>
-              <a:t>24/05/15</a:t>
+              <a:t>25/05/15</a:t>
             </a:fld>
             <a:endParaRPr lang="en-US"/>
           </a:p>
@@ -469,7 +470,7 @@
           <a:p>
             <a:fld id="{8B4F63E6-11C5-EA4B-89F5-9A8FD5F78CD0}" type="datetimeFigureOut">
               <a:rPr lang="en-US" smtClean="0"/>
-              <a:t>24/05/15</a:t>
+              <a:t>25/05/15</a:t>
             </a:fld>
             <a:endParaRPr lang="en-US"/>
           </a:p>
@@ -649,7 +650,7 @@
           <a:p>
             <a:fld id="{8B4F63E6-11C5-EA4B-89F5-9A8FD5F78CD0}" type="datetimeFigureOut">
               <a:rPr lang="en-US" smtClean="0"/>
-              <a:t>24/05/15</a:t>
+              <a:t>25/05/15</a:t>
             </a:fld>
             <a:endParaRPr lang="en-US"/>
           </a:p>
@@ -819,7 +820,7 @@
           <a:p>
             <a:fld id="{8B4F63E6-11C5-EA4B-89F5-9A8FD5F78CD0}" type="datetimeFigureOut">
               <a:rPr lang="en-US" smtClean="0"/>
-              <a:t>24/05/15</a:t>
+              <a:t>25/05/15</a:t>
             </a:fld>
             <a:endParaRPr lang="en-US"/>
           </a:p>
@@ -1065,7 +1066,7 @@
           <a:p>
             <a:fld id="{8B4F63E6-11C5-EA4B-89F5-9A8FD5F78CD0}" type="datetimeFigureOut">
               <a:rPr lang="en-US" smtClean="0"/>
-              <a:t>24/05/15</a:t>
+              <a:t>25/05/15</a:t>
             </a:fld>
             <a:endParaRPr lang="en-US"/>
           </a:p>
@@ -1353,7 +1354,7 @@
           <a:p>
             <a:fld id="{8B4F63E6-11C5-EA4B-89F5-9A8FD5F78CD0}" type="datetimeFigureOut">
               <a:rPr lang="en-US" smtClean="0"/>
-              <a:t>24/05/15</a:t>
+              <a:t>25/05/15</a:t>
             </a:fld>
             <a:endParaRPr lang="en-US"/>
           </a:p>
@@ -1775,7 +1776,7 @@
           <a:p>
             <a:fld id="{8B4F63E6-11C5-EA4B-89F5-9A8FD5F78CD0}" type="datetimeFigureOut">
               <a:rPr lang="en-US" smtClean="0"/>
-              <a:t>24/05/15</a:t>
+              <a:t>25/05/15</a:t>
             </a:fld>
             <a:endParaRPr lang="en-US"/>
           </a:p>
@@ -1893,7 +1894,7 @@
           <a:p>
             <a:fld id="{8B4F63E6-11C5-EA4B-89F5-9A8FD5F78CD0}" type="datetimeFigureOut">
               <a:rPr lang="en-US" smtClean="0"/>
-              <a:t>24/05/15</a:t>
+              <a:t>25/05/15</a:t>
             </a:fld>
             <a:endParaRPr lang="en-US"/>
           </a:p>
@@ -1988,7 +1989,7 @@
           <a:p>
             <a:fld id="{8B4F63E6-11C5-EA4B-89F5-9A8FD5F78CD0}" type="datetimeFigureOut">
               <a:rPr lang="en-US" smtClean="0"/>
-              <a:t>24/05/15</a:t>
+              <a:t>25/05/15</a:t>
             </a:fld>
             <a:endParaRPr lang="en-US"/>
           </a:p>
@@ -2265,7 +2266,7 @@
           <a:p>
             <a:fld id="{8B4F63E6-11C5-EA4B-89F5-9A8FD5F78CD0}" type="datetimeFigureOut">
               <a:rPr lang="en-US" smtClean="0"/>
-              <a:t>24/05/15</a:t>
+              <a:t>25/05/15</a:t>
             </a:fld>
             <a:endParaRPr lang="en-US"/>
           </a:p>
@@ -2518,7 +2519,7 @@
           <a:p>
             <a:fld id="{8B4F63E6-11C5-EA4B-89F5-9A8FD5F78CD0}" type="datetimeFigureOut">
               <a:rPr lang="en-US" smtClean="0"/>
-              <a:t>24/05/15</a:t>
+              <a:t>25/05/15</a:t>
             </a:fld>
             <a:endParaRPr lang="en-US"/>
           </a:p>
@@ -2731,7 +2732,7 @@
           <a:p>
             <a:fld id="{8B4F63E6-11C5-EA4B-89F5-9A8FD5F78CD0}" type="datetimeFigureOut">
               <a:rPr lang="en-US" smtClean="0"/>
-              <a:t>24/05/15</a:t>
+              <a:t>25/05/15</a:t>
             </a:fld>
             <a:endParaRPr lang="en-US"/>
           </a:p>
@@ -3237,13 +3238,21 @@
         <p:spPr/>
         <p:txBody>
           <a:bodyPr>
-            <a:normAutofit/>
+            <a:normAutofit fontScale="90000"/>
           </a:bodyPr>
           <a:lstStyle/>
           <a:p>
             <a:r>
               <a:rPr lang="en-US" dirty="0" smtClean="0"/>
-              <a:t>Charter 1I: Find Bugs in a Feature</a:t>
+              <a:t>Charter 1: </a:t>
+            </a:r>
+            <a:r>
+              <a:rPr lang="en-US" dirty="0" err="1" smtClean="0"/>
+              <a:t>Mindmap</a:t>
+            </a:r>
+            <a:r>
+              <a:rPr lang="en-US" dirty="0" smtClean="0"/>
+              <a:t> of Features for Image Animator </a:t>
             </a:r>
             <a:endParaRPr lang="en-US" dirty="0"/>
           </a:p>
@@ -3261,19 +3270,76 @@
         </p:nvSpPr>
         <p:spPr/>
         <p:txBody>
-          <a:bodyPr/>
+          <a:bodyPr>
+            <a:normAutofit lnSpcReduction="10000"/>
+          </a:bodyPr>
           <a:lstStyle/>
           <a:p>
             <a:r>
               <a:rPr lang="en-US" dirty="0" smtClean="0"/>
-              <a:t>Explore a feature of choice to identify bugs as in “anything that might bug a user”</a:t>
-            </a:r>
-          </a:p>
-          <a:p>
+              <a:t>Explore the product using </a:t>
+            </a:r>
+            <a:r>
+              <a:rPr lang="en-US" dirty="0" err="1" smtClean="0"/>
+              <a:t>mindmup.org</a:t>
+            </a:r>
             <a:r>
               <a:rPr lang="en-US" dirty="0" smtClean="0"/>
-              <a:t>Report issues in “Bug database” on the wall</a:t>
-            </a:r>
+              <a:t> to create an outline of functionalities to test in the application</a:t>
+            </a:r>
+          </a:p>
+          <a:p>
+            <a:r>
+              <a:rPr lang="en-US" dirty="0" smtClean="0"/>
+              <a:t>Sharing notes to learn to identify functionalities as an exploratory tester</a:t>
+            </a:r>
+          </a:p>
+          <a:p>
+            <a:endParaRPr lang="en-US" dirty="0"/>
+          </a:p>
+          <a:p>
+            <a:r>
+              <a:rPr lang="en-US" dirty="0"/>
+              <a:t>Test data to start from:</a:t>
+            </a:r>
+          </a:p>
+          <a:p>
+            <a:pPr lvl="1"/>
+            <a:r>
+              <a:rPr lang="en-US" dirty="0"/>
+              <a:t>In </a:t>
+            </a:r>
+            <a:r>
+              <a:rPr lang="en-US" dirty="0" err="1"/>
+              <a:t>darkFunction</a:t>
+            </a:r>
+            <a:r>
+              <a:rPr lang="en-US" dirty="0"/>
+              <a:t>-Editor/</a:t>
+            </a:r>
+            <a:r>
+              <a:rPr lang="en-US" dirty="0" err="1"/>
+              <a:t>TestingResources</a:t>
+            </a:r>
+            <a:r>
+              <a:rPr lang="en-US" dirty="0"/>
+              <a:t>/</a:t>
+            </a:r>
+            <a:r>
+              <a:rPr lang="en-US" dirty="0" err="1"/>
+              <a:t>StarWarsImages</a:t>
+            </a:r>
+            <a:r>
+              <a:rPr lang="en-US" dirty="0"/>
+              <a:t>/</a:t>
+            </a:r>
+            <a:r>
+              <a:rPr lang="en-US" dirty="0" err="1"/>
+              <a:t>SWAll.sprites</a:t>
+            </a:r>
+            <a:endParaRPr lang="en-US" dirty="0"/>
+          </a:p>
+          <a:p>
             <a:endParaRPr lang="en-US" dirty="0"/>
           </a:p>
         </p:txBody>
@@ -3281,7 +3347,7 @@
     </p:spTree>
     <p:extLst>
       <p:ext uri="{BB962C8B-B14F-4D97-AF65-F5344CB8AC3E}">
-        <p14:creationId xmlns:p14="http://schemas.microsoft.com/office/powerpoint/2010/main" val="4146125420"/>
+        <p14:creationId xmlns:p14="http://schemas.microsoft.com/office/powerpoint/2010/main" val="791163864"/>
       </p:ext>
     </p:extLst>
   </p:cSld>
@@ -3334,6 +3400,97 @@
           <a:p>
             <a:r>
               <a:rPr lang="en-US" dirty="0" smtClean="0"/>
+              <a:t>Charter 1I: Find Bugs in a Feature</a:t>
+            </a:r>
+            <a:endParaRPr lang="en-US" dirty="0"/>
+          </a:p>
+        </p:txBody>
+      </p:sp>
+      <p:sp>
+        <p:nvSpPr>
+          <p:cNvPr id="4" name="Content Placeholder 3"/>
+          <p:cNvSpPr>
+            <a:spLocks noGrp="1"/>
+          </p:cNvSpPr>
+          <p:nvPr>
+            <p:ph idx="1"/>
+          </p:nvPr>
+        </p:nvSpPr>
+        <p:spPr/>
+        <p:txBody>
+          <a:bodyPr/>
+          <a:lstStyle/>
+          <a:p>
+            <a:r>
+              <a:rPr lang="en-US" dirty="0" smtClean="0"/>
+              <a:t>Explore a feature of choice to identify bugs as in “anything that might bug a user”</a:t>
+            </a:r>
+          </a:p>
+          <a:p>
+            <a:r>
+              <a:rPr lang="en-US" dirty="0" smtClean="0"/>
+              <a:t>Report issues in “Bug database” on the wall</a:t>
+            </a:r>
+            <a:endParaRPr lang="en-US" dirty="0"/>
+          </a:p>
+        </p:txBody>
+      </p:sp>
+    </p:spTree>
+    <p:extLst>
+      <p:ext uri="{BB962C8B-B14F-4D97-AF65-F5344CB8AC3E}">
+        <p14:creationId xmlns:p14="http://schemas.microsoft.com/office/powerpoint/2010/main" val="4146125420"/>
+      </p:ext>
+    </p:extLst>
+  </p:cSld>
+  <p:clrMapOvr>
+    <a:masterClrMapping/>
+  </p:clrMapOvr>
+  <p:timing>
+    <p:tnLst>
+      <p:par>
+        <p:cTn xmlns:p14="http://schemas.microsoft.com/office/powerpoint/2010/main" id="1" dur="indefinite" restart="never" nodeType="tmRoot"/>
+      </p:par>
+    </p:tnLst>
+  </p:timing>
+</p:sld>
+</file>
+
+<file path=ppt/slides/slide12.xml><?xml version="1.0" encoding="utf-8"?>
+<p:sld xmlns:a="http://schemas.openxmlformats.org/drawingml/2006/main" xmlns:r="http://schemas.openxmlformats.org/officeDocument/2006/relationships" xmlns:p="http://schemas.openxmlformats.org/presentationml/2006/main">
+  <p:cSld>
+    <p:spTree>
+      <p:nvGrpSpPr>
+        <p:cNvPr id="1" name=""/>
+        <p:cNvGrpSpPr/>
+        <p:nvPr/>
+      </p:nvGrpSpPr>
+      <p:grpSpPr>
+        <a:xfrm>
+          <a:off x="0" y="0"/>
+          <a:ext cx="0" cy="0"/>
+          <a:chOff x="0" y="0"/>
+          <a:chExt cx="0" cy="0"/>
+        </a:xfrm>
+      </p:grpSpPr>
+      <p:sp>
+        <p:nvSpPr>
+          <p:cNvPr id="3" name="Title 2"/>
+          <p:cNvSpPr>
+            <a:spLocks noGrp="1"/>
+          </p:cNvSpPr>
+          <p:nvPr>
+            <p:ph type="title"/>
+          </p:nvPr>
+        </p:nvSpPr>
+        <p:spPr/>
+        <p:txBody>
+          <a:bodyPr>
+            <a:normAutofit/>
+          </a:bodyPr>
+          <a:lstStyle/>
+          <a:p>
+            <a:r>
+              <a:rPr lang="en-US" dirty="0" smtClean="0"/>
               <a:t>Charter III: Exploring Code</a:t>
             </a:r>
             <a:endParaRPr lang="en-US" dirty="0"/>
@@ -3402,7 +3559,7 @@
 </p:sld>
 </file>
 
-<file path=ppt/slides/slide12.xml><?xml version="1.0" encoding="utf-8"?>
+<file path=ppt/slides/slide13.xml><?xml version="1.0" encoding="utf-8"?>
 <p:sld xmlns:a="http://schemas.openxmlformats.org/drawingml/2006/main" xmlns:r="http://schemas.openxmlformats.org/officeDocument/2006/relationships" xmlns:p="http://schemas.openxmlformats.org/presentationml/2006/main">
   <p:cSld>
     <p:spTree>
@@ -4851,6 +5008,125 @@
       </p:grpSpPr>
       <p:sp>
         <p:nvSpPr>
+          <p:cNvPr id="2" name="Title 1"/>
+          <p:cNvSpPr>
+            <a:spLocks noGrp="1"/>
+          </p:cNvSpPr>
+          <p:nvPr>
+            <p:ph type="title"/>
+          </p:nvPr>
+        </p:nvSpPr>
+        <p:spPr/>
+        <p:txBody>
+          <a:bodyPr/>
+          <a:lstStyle/>
+          <a:p>
+            <a:r>
+              <a:rPr lang="en-US" dirty="0" smtClean="0"/>
+              <a:t>Getting the Software to Test</a:t>
+            </a:r>
+            <a:endParaRPr lang="en-US" dirty="0"/>
+          </a:p>
+        </p:txBody>
+      </p:sp>
+      <p:sp>
+        <p:nvSpPr>
+          <p:cNvPr id="3" name="Content Placeholder 2"/>
+          <p:cNvSpPr>
+            <a:spLocks noGrp="1"/>
+          </p:cNvSpPr>
+          <p:nvPr>
+            <p:ph idx="1"/>
+          </p:nvPr>
+        </p:nvSpPr>
+        <p:spPr/>
+        <p:txBody>
+          <a:bodyPr/>
+          <a:lstStyle/>
+          <a:p>
+            <a:r>
+              <a:rPr lang="en-US" dirty="0">
+                <a:hlinkClick r:id="rId2"/>
+              </a:rPr>
+              <a:t>http://darkfunction.com/editor</a:t>
+            </a:r>
+            <a:r>
+              <a:rPr lang="en-US" dirty="0" smtClean="0">
+                <a:hlinkClick r:id="rId2"/>
+              </a:rPr>
+              <a:t>/</a:t>
+            </a:r>
+            <a:endParaRPr lang="en-US" dirty="0" smtClean="0"/>
+          </a:p>
+          <a:p>
+            <a:pPr marL="0" indent="0">
+              <a:buNone/>
+            </a:pPr>
+            <a:r>
+              <a:rPr lang="en-US" dirty="0" smtClean="0">
+                <a:sym typeface="Wingdings"/>
+              </a:rPr>
+              <a:t> Download the jar</a:t>
+            </a:r>
+          </a:p>
+          <a:p>
+            <a:r>
+              <a:rPr lang="en-US" dirty="0">
+                <a:hlinkClick r:id="rId3"/>
+              </a:rPr>
+              <a:t>http://lfal.co/</a:t>
+            </a:r>
+            <a:r>
+              <a:rPr lang="en-US" dirty="0" smtClean="0">
+                <a:hlinkClick r:id="rId3"/>
+              </a:rPr>
+              <a:t>DfExamples</a:t>
+            </a:r>
+            <a:endParaRPr lang="en-US" dirty="0" smtClean="0"/>
+          </a:p>
+          <a:p>
+            <a:r>
+              <a:rPr lang="en-US" dirty="0" smtClean="0">
+                <a:sym typeface="Wingdings"/>
+              </a:rPr>
+              <a:t> Download as zip</a:t>
+            </a:r>
+            <a:endParaRPr lang="en-US" dirty="0"/>
+          </a:p>
+        </p:txBody>
+      </p:sp>
+    </p:spTree>
+    <p:extLst>
+      <p:ext uri="{BB962C8B-B14F-4D97-AF65-F5344CB8AC3E}">
+        <p14:creationId xmlns:p14="http://schemas.microsoft.com/office/powerpoint/2010/main" val="314291781"/>
+      </p:ext>
+    </p:extLst>
+  </p:cSld>
+  <p:clrMapOvr>
+    <a:masterClrMapping/>
+  </p:clrMapOvr>
+</p:sld>
+</file>
+
+<file path=ppt/slides/slide8.xml><?xml version="1.0" encoding="utf-8"?>
+<p:sld xmlns:a="http://schemas.openxmlformats.org/drawingml/2006/main" xmlns:r="http://schemas.openxmlformats.org/officeDocument/2006/relationships" xmlns:p="http://schemas.openxmlformats.org/presentationml/2006/main">
+  <p:cSld>
+    <p:spTree>
+      <p:nvGrpSpPr>
+        <p:cNvPr id="1" name=""/>
+        <p:cNvGrpSpPr/>
+        <p:nvPr/>
+      </p:nvGrpSpPr>
+      <p:grpSpPr>
+        <a:xfrm>
+          <a:off x="0" y="0"/>
+          <a:ext cx="0" cy="0"/>
+          <a:chOff x="0" y="0"/>
+          <a:chExt cx="0" cy="0"/>
+        </a:xfrm>
+      </p:grpSpPr>
+      <p:sp>
+        <p:nvSpPr>
           <p:cNvPr id="4" name="Title 3"/>
           <p:cNvSpPr>
             <a:spLocks noGrp="1"/>
@@ -4923,11 +5199,7 @@
             <a:pPr lvl="1"/>
             <a:r>
               <a:rPr lang="en-US" sz="3600" dirty="0" smtClean="0"/>
-              <a:t>Run (Ctrl+F11</a:t>
-            </a:r>
-            <a:r>
-              <a:rPr lang="en-US" sz="3600" dirty="0" smtClean="0"/>
-              <a:t>)</a:t>
+              <a:t>Run (Ctrl+F11)</a:t>
             </a:r>
           </a:p>
           <a:p>
@@ -5105,7 +5377,7 @@
 </p:sld>
 </file>
 
-<file path=ppt/slides/slide8.xml><?xml version="1.0" encoding="utf-8"?>
+<file path=ppt/slides/slide9.xml><?xml version="1.0" encoding="utf-8"?>
 <p:sld xmlns:a="http://schemas.openxmlformats.org/drawingml/2006/main" xmlns:r="http://schemas.openxmlformats.org/officeDocument/2006/relationships" xmlns:p="http://schemas.openxmlformats.org/presentationml/2006/main">
   <p:cSld>
     <p:spTree>
@@ -5311,7 +5583,6 @@
               <a:rPr lang="en-US" sz="3200" b="1" dirty="0" smtClean="0"/>
               <a:t>Llewellyn Falco</a:t>
             </a:r>
-            <a:endParaRPr lang="en-US" sz="3200" b="1" dirty="0" smtClean="0"/>
           </a:p>
           <a:p>
             <a:r>
@@ -5327,11 +5598,7 @@
           <a:p>
             <a:r>
               <a:rPr lang="en-US" sz="3200" dirty="0" smtClean="0"/>
-              <a:t>Twitter: </a:t>
-            </a:r>
-            <a:r>
-              <a:rPr lang="en-US" sz="3200" dirty="0" smtClean="0"/>
-              <a:t>@</a:t>
+              <a:t>Twitter: @</a:t>
             </a:r>
             <a:r>
               <a:rPr lang="en-US" sz="3200" dirty="0" err="1" smtClean="0"/>
@@ -5346,11 +5613,7 @@
             </a:r>
             <a:r>
               <a:rPr lang="en-US" sz="3200" dirty="0" err="1" smtClean="0"/>
-              <a:t>llewellynfalco</a:t>
-            </a:r>
-            <a:r>
-              <a:rPr lang="en-US" sz="3200" dirty="0" err="1" smtClean="0"/>
-              <a:t>.blogspot.com</a:t>
+              <a:t>llewellynfalco.blogspot.com</a:t>
             </a:r>
             <a:endParaRPr lang="en-US" sz="3200" dirty="0" smtClean="0"/>
           </a:p>
@@ -5363,162 +5626,6 @@
     <p:extLst>
       <p:ext uri="{BB962C8B-B14F-4D97-AF65-F5344CB8AC3E}">
         <p14:creationId xmlns:p14="http://schemas.microsoft.com/office/powerpoint/2010/main" val="2430598829"/>
-      </p:ext>
-    </p:extLst>
-  </p:cSld>
-  <p:clrMapOvr>
-    <a:masterClrMapping/>
-  </p:clrMapOvr>
-  <p:timing>
-    <p:tnLst>
-      <p:par>
-        <p:cTn xmlns:p14="http://schemas.microsoft.com/office/powerpoint/2010/main" id="1" dur="indefinite" restart="never" nodeType="tmRoot"/>
-      </p:par>
-    </p:tnLst>
-  </p:timing>
-</p:sld>
-</file>
-
-<file path=ppt/slides/slide9.xml><?xml version="1.0" encoding="utf-8"?>
-<p:sld xmlns:a="http://schemas.openxmlformats.org/drawingml/2006/main" xmlns:r="http://schemas.openxmlformats.org/officeDocument/2006/relationships" xmlns:p="http://schemas.openxmlformats.org/presentationml/2006/main">
-  <p:cSld>
-    <p:spTree>
-      <p:nvGrpSpPr>
-        <p:cNvPr id="1" name=""/>
-        <p:cNvGrpSpPr/>
-        <p:nvPr/>
-      </p:nvGrpSpPr>
-      <p:grpSpPr>
-        <a:xfrm>
-          <a:off x="0" y="0"/>
-          <a:ext cx="0" cy="0"/>
-          <a:chOff x="0" y="0"/>
-          <a:chExt cx="0" cy="0"/>
-        </a:xfrm>
-      </p:grpSpPr>
-      <p:sp>
-        <p:nvSpPr>
-          <p:cNvPr id="3" name="Title 2"/>
-          <p:cNvSpPr>
-            <a:spLocks noGrp="1"/>
-          </p:cNvSpPr>
-          <p:nvPr>
-            <p:ph type="title"/>
-          </p:nvPr>
-        </p:nvSpPr>
-        <p:spPr/>
-        <p:txBody>
-          <a:bodyPr>
-            <a:normAutofit fontScale="90000"/>
-          </a:bodyPr>
-          <a:lstStyle/>
-          <a:p>
-            <a:r>
-              <a:rPr lang="en-US" dirty="0" smtClean="0"/>
-              <a:t>Charter 1: </a:t>
-            </a:r>
-            <a:r>
-              <a:rPr lang="en-US" dirty="0" err="1" smtClean="0"/>
-              <a:t>Mindmap</a:t>
-            </a:r>
-            <a:r>
-              <a:rPr lang="en-US" dirty="0" smtClean="0"/>
-              <a:t> of Features for Image Animator </a:t>
-            </a:r>
-            <a:endParaRPr lang="en-US" dirty="0"/>
-          </a:p>
-        </p:txBody>
-      </p:sp>
-      <p:sp>
-        <p:nvSpPr>
-          <p:cNvPr id="4" name="Content Placeholder 3"/>
-          <p:cNvSpPr>
-            <a:spLocks noGrp="1"/>
-          </p:cNvSpPr>
-          <p:nvPr>
-            <p:ph idx="1"/>
-          </p:nvPr>
-        </p:nvSpPr>
-        <p:spPr/>
-        <p:txBody>
-          <a:bodyPr>
-            <a:normAutofit lnSpcReduction="10000"/>
-          </a:bodyPr>
-          <a:lstStyle/>
-          <a:p>
-            <a:r>
-              <a:rPr lang="en-US" dirty="0" smtClean="0"/>
-              <a:t>Explore the product using </a:t>
-            </a:r>
-            <a:r>
-              <a:rPr lang="en-US" dirty="0" err="1" smtClean="0"/>
-              <a:t>mindmup.org</a:t>
-            </a:r>
-            <a:r>
-              <a:rPr lang="en-US" dirty="0" smtClean="0"/>
-              <a:t> to create an outline of functionalities to test in the application</a:t>
-            </a:r>
-          </a:p>
-          <a:p>
-            <a:r>
-              <a:rPr lang="en-US" dirty="0" smtClean="0"/>
-              <a:t>Sharing notes to learn to identify functionalities as an exploratory tester</a:t>
-            </a:r>
-          </a:p>
-          <a:p>
-            <a:endParaRPr lang="en-US" dirty="0"/>
-          </a:p>
-          <a:p>
-            <a:r>
-              <a:rPr lang="en-US" dirty="0"/>
-              <a:t>Test data to start from:</a:t>
-            </a:r>
-          </a:p>
-          <a:p>
-            <a:pPr lvl="1"/>
-            <a:r>
-              <a:rPr lang="en-US" dirty="0"/>
-              <a:t>In </a:t>
-            </a:r>
-            <a:r>
-              <a:rPr lang="en-US" dirty="0" err="1"/>
-              <a:t>darkFunction</a:t>
-            </a:r>
-            <a:r>
-              <a:rPr lang="en-US" dirty="0"/>
-              <a:t>-Editor/</a:t>
-            </a:r>
-            <a:r>
-              <a:rPr lang="en-US" dirty="0" err="1"/>
-              <a:t>TestingResources</a:t>
-            </a:r>
-            <a:r>
-              <a:rPr lang="en-US" dirty="0"/>
-              <a:t>/</a:t>
-            </a:r>
-            <a:r>
-              <a:rPr lang="en-US" dirty="0" err="1"/>
-              <a:t>StarWarsImages</a:t>
-            </a:r>
-            <a:r>
-              <a:rPr lang="en-US" dirty="0"/>
-              <a:t>/</a:t>
-            </a:r>
-            <a:r>
-              <a:rPr lang="en-US" dirty="0" err="1"/>
-              <a:t>SWAll.sprites</a:t>
-            </a:r>
-            <a:endParaRPr lang="en-US" dirty="0"/>
-          </a:p>
-          <a:p>
-            <a:endParaRPr lang="en-US" dirty="0"/>
-          </a:p>
-        </p:txBody>
-      </p:sp>
-    </p:spTree>
-    <p:extLst>
-      <p:ext uri="{BB962C8B-B14F-4D97-AF65-F5344CB8AC3E}">
-        <p14:creationId xmlns:p14="http://schemas.microsoft.com/office/powerpoint/2010/main" val="791163864"/>
       </p:ext>
     </p:extLst>
   </p:cSld>

</xml_diff>